<commit_message>
hecho el manual de usuario
</commit_message>
<xml_diff>
--- a/docs/PresentaciónFinal.pptx
+++ b/docs/PresentaciónFinal.pptx
@@ -23,8 +23,9 @@
     <p:sldId id="295" r:id="rId17"/>
     <p:sldId id="294" r:id="rId18"/>
     <p:sldId id="290" r:id="rId19"/>
-    <p:sldId id="292" r:id="rId20"/>
-    <p:sldId id="293" r:id="rId21"/>
+    <p:sldId id="296" r:id="rId20"/>
+    <p:sldId id="292" r:id="rId21"/>
+    <p:sldId id="293" r:id="rId22"/>
   </p:sldIdLst>
   <p:sldSz cx="9144000" cy="6858000" type="screen4x3"/>
   <p:notesSz cx="6858000" cy="9144000"/>
@@ -751,7 +752,8 @@
           <a:p>
             <a:fld id="{377DD94B-5083-42BA-86C1-783F880AFC31}" type="datetimeFigureOut">
               <a:rPr lang="es-ES" smtClean="0"/>
-              <a:t>10/06/2013</a:t>
+              <a:pPr/>
+              <a:t>11/06/2013</a:t>
             </a:fld>
             <a:endParaRPr lang="es-ES"/>
           </a:p>
@@ -813,6 +815,7 @@
           <a:p>
             <a:fld id="{BADE4E16-6FAE-456F-8B1A-9B99E2C5D1FF}" type="slidenum">
               <a:rPr lang="es-ES" smtClean="0"/>
+              <a:pPr/>
               <a:t>‹Nº›</a:t>
             </a:fld>
             <a:endParaRPr lang="es-ES"/>
@@ -947,7 +950,8 @@
           <a:p>
             <a:fld id="{377DD94B-5083-42BA-86C1-783F880AFC31}" type="datetimeFigureOut">
               <a:rPr lang="es-ES" smtClean="0"/>
-              <a:t>10/06/2013</a:t>
+              <a:pPr/>
+              <a:t>11/06/2013</a:t>
             </a:fld>
             <a:endParaRPr lang="es-ES"/>
           </a:p>
@@ -993,6 +997,7 @@
           <a:p>
             <a:fld id="{BADE4E16-6FAE-456F-8B1A-9B99E2C5D1FF}" type="slidenum">
               <a:rPr lang="es-ES" smtClean="0"/>
+              <a:pPr/>
               <a:t>‹Nº›</a:t>
             </a:fld>
             <a:endParaRPr lang="es-ES"/>
@@ -1132,7 +1137,8 @@
           <a:p>
             <a:fld id="{377DD94B-5083-42BA-86C1-783F880AFC31}" type="datetimeFigureOut">
               <a:rPr lang="es-ES" smtClean="0"/>
-              <a:t>10/06/2013</a:t>
+              <a:pPr/>
+              <a:t>11/06/2013</a:t>
             </a:fld>
             <a:endParaRPr lang="es-ES"/>
           </a:p>
@@ -1178,6 +1184,7 @@
           <a:p>
             <a:fld id="{BADE4E16-6FAE-456F-8B1A-9B99E2C5D1FF}" type="slidenum">
               <a:rPr lang="es-ES" smtClean="0"/>
+              <a:pPr/>
               <a:t>‹Nº›</a:t>
             </a:fld>
             <a:endParaRPr lang="es-ES"/>
@@ -1282,7 +1289,8 @@
           <a:p>
             <a:fld id="{377DD94B-5083-42BA-86C1-783F880AFC31}" type="datetimeFigureOut">
               <a:rPr lang="es-ES" smtClean="0"/>
-              <a:t>10/06/2013</a:t>
+              <a:pPr/>
+              <a:t>11/06/2013</a:t>
             </a:fld>
             <a:endParaRPr lang="es-ES"/>
           </a:p>
@@ -1328,6 +1336,7 @@
           <a:p>
             <a:fld id="{BADE4E16-6FAE-456F-8B1A-9B99E2C5D1FF}" type="slidenum">
               <a:rPr lang="es-ES" smtClean="0"/>
+              <a:pPr/>
               <a:t>‹Nº›</a:t>
             </a:fld>
             <a:endParaRPr lang="es-ES"/>
@@ -1537,7 +1546,8 @@
           <a:p>
             <a:fld id="{377DD94B-5083-42BA-86C1-783F880AFC31}" type="datetimeFigureOut">
               <a:rPr lang="es-ES" smtClean="0"/>
-              <a:t>10/06/2013</a:t>
+              <a:pPr/>
+              <a:t>11/06/2013</a:t>
             </a:fld>
             <a:endParaRPr lang="es-ES"/>
           </a:p>
@@ -1583,6 +1593,7 @@
           <a:p>
             <a:fld id="{BADE4E16-6FAE-456F-8B1A-9B99E2C5D1FF}" type="slidenum">
               <a:rPr lang="es-ES" smtClean="0"/>
+              <a:pPr/>
               <a:t>‹Nº›</a:t>
             </a:fld>
             <a:endParaRPr lang="es-ES"/>
@@ -1946,7 +1957,8 @@
           <a:p>
             <a:fld id="{377DD94B-5083-42BA-86C1-783F880AFC31}" type="datetimeFigureOut">
               <a:rPr lang="es-ES" smtClean="0"/>
-              <a:t>10/06/2013</a:t>
+              <a:pPr/>
+              <a:t>11/06/2013</a:t>
             </a:fld>
             <a:endParaRPr lang="es-ES"/>
           </a:p>
@@ -1992,6 +2004,7 @@
           <a:p>
             <a:fld id="{BADE4E16-6FAE-456F-8B1A-9B99E2C5D1FF}" type="slidenum">
               <a:rPr lang="es-ES" smtClean="0"/>
+              <a:pPr/>
               <a:t>‹Nº›</a:t>
             </a:fld>
             <a:endParaRPr lang="es-ES"/>
@@ -2392,7 +2405,8 @@
           <a:p>
             <a:fld id="{377DD94B-5083-42BA-86C1-783F880AFC31}" type="datetimeFigureOut">
               <a:rPr lang="es-ES" smtClean="0"/>
-              <a:t>10/06/2013</a:t>
+              <a:pPr/>
+              <a:t>11/06/2013</a:t>
             </a:fld>
             <a:endParaRPr lang="es-ES"/>
           </a:p>
@@ -2438,6 +2452,7 @@
           <a:p>
             <a:fld id="{BADE4E16-6FAE-456F-8B1A-9B99E2C5D1FF}" type="slidenum">
               <a:rPr lang="es-ES" smtClean="0"/>
+              <a:pPr/>
               <a:t>‹Nº›</a:t>
             </a:fld>
             <a:endParaRPr lang="es-ES"/>
@@ -2493,7 +2508,8 @@
           <a:p>
             <a:fld id="{377DD94B-5083-42BA-86C1-783F880AFC31}" type="datetimeFigureOut">
               <a:rPr lang="es-ES" smtClean="0"/>
-              <a:t>10/06/2013</a:t>
+              <a:pPr/>
+              <a:t>11/06/2013</a:t>
             </a:fld>
             <a:endParaRPr lang="es-ES"/>
           </a:p>
@@ -2539,6 +2555,7 @@
           <a:p>
             <a:fld id="{BADE4E16-6FAE-456F-8B1A-9B99E2C5D1FF}" type="slidenum">
               <a:rPr lang="es-ES" smtClean="0"/>
+              <a:pPr/>
               <a:t>‹Nº›</a:t>
             </a:fld>
             <a:endParaRPr lang="es-ES"/>
@@ -2614,7 +2631,8 @@
           <a:p>
             <a:fld id="{377DD94B-5083-42BA-86C1-783F880AFC31}" type="datetimeFigureOut">
               <a:rPr lang="es-ES" smtClean="0"/>
-              <a:t>10/06/2013</a:t>
+              <a:pPr/>
+              <a:t>11/06/2013</a:t>
             </a:fld>
             <a:endParaRPr lang="es-ES"/>
           </a:p>
@@ -2660,6 +2678,7 @@
           <a:p>
             <a:fld id="{BADE4E16-6FAE-456F-8B1A-9B99E2C5D1FF}" type="slidenum">
               <a:rPr lang="es-ES" smtClean="0"/>
+              <a:pPr/>
               <a:t>‹Nº›</a:t>
             </a:fld>
             <a:endParaRPr lang="es-ES"/>
@@ -2888,7 +2907,8 @@
           <a:p>
             <a:fld id="{377DD94B-5083-42BA-86C1-783F880AFC31}" type="datetimeFigureOut">
               <a:rPr lang="es-ES" smtClean="0"/>
-              <a:t>10/06/2013</a:t>
+              <a:pPr/>
+              <a:t>11/06/2013</a:t>
             </a:fld>
             <a:endParaRPr lang="es-ES"/>
           </a:p>
@@ -2934,6 +2954,7 @@
           <a:p>
             <a:fld id="{BADE4E16-6FAE-456F-8B1A-9B99E2C5D1FF}" type="slidenum">
               <a:rPr lang="es-ES" smtClean="0"/>
+              <a:pPr/>
               <a:t>‹Nº›</a:t>
             </a:fld>
             <a:endParaRPr lang="es-ES"/>
@@ -3093,7 +3114,8 @@
           <a:p>
             <a:fld id="{377DD94B-5083-42BA-86C1-783F880AFC31}" type="datetimeFigureOut">
               <a:rPr lang="es-ES" smtClean="0"/>
-              <a:t>10/06/2013</a:t>
+              <a:pPr/>
+              <a:t>11/06/2013</a:t>
             </a:fld>
             <a:endParaRPr lang="es-ES"/>
           </a:p>
@@ -3158,6 +3180,7 @@
           <a:p>
             <a:fld id="{BADE4E16-6FAE-456F-8B1A-9B99E2C5D1FF}" type="slidenum">
               <a:rPr lang="es-ES" smtClean="0"/>
+              <a:pPr/>
               <a:t>‹Nº›</a:t>
             </a:fld>
             <a:endParaRPr lang="es-ES"/>
@@ -4202,7 +4225,8 @@
           <a:p>
             <a:fld id="{377DD94B-5083-42BA-86C1-783F880AFC31}" type="datetimeFigureOut">
               <a:rPr lang="es-ES" smtClean="0"/>
-              <a:t>10/06/2013</a:t>
+              <a:pPr/>
+              <a:t>11/06/2013</a:t>
             </a:fld>
             <a:endParaRPr lang="es-ES"/>
           </a:p>
@@ -4278,6 +4302,7 @@
           <a:p>
             <a:fld id="{BADE4E16-6FAE-456F-8B1A-9B99E2C5D1FF}" type="slidenum">
               <a:rPr lang="es-ES" smtClean="0"/>
+              <a:pPr/>
               <a:t>‹Nº›</a:t>
             </a:fld>
             <a:endParaRPr lang="es-ES"/>
@@ -4740,29 +4765,8 @@
             <a:pPr lvl="2"/>
             <a:r>
               <a:rPr lang="es-ES" sz="2200" b="1" dirty="0" smtClean="0"/>
-              <a:t>Fecha </a:t>
-            </a:r>
-            <a:r>
-              <a:rPr lang="es-ES" sz="2200" b="1" dirty="0" smtClean="0"/>
-              <a:t>Entrega : </a:t>
-            </a:r>
-            <a:r>
-              <a:rPr lang="es-ES" sz="2200" b="1" dirty="0" smtClean="0"/>
-              <a:t>11 </a:t>
-            </a:r>
-            <a:r>
-              <a:rPr lang="es-ES" sz="2200" b="1" dirty="0" smtClean="0"/>
-              <a:t>de Abril </a:t>
-            </a:r>
-            <a:r>
-              <a:rPr lang="es-ES" sz="2200" b="1" dirty="0" smtClean="0"/>
-              <a:t>de </a:t>
-            </a:r>
-            <a:r>
-              <a:rPr lang="es-ES" sz="2200" b="1" dirty="0" smtClean="0"/>
-              <a:t>2013. </a:t>
-            </a:r>
-            <a:endParaRPr lang="es-ES" sz="2200" b="1" dirty="0" smtClean="0"/>
+              <a:t>Fecha Entrega : 11 de Abril de 2013. </a:t>
+            </a:r>
           </a:p>
           <a:p>
             <a:pPr lvl="1"/>
@@ -4775,57 +4779,16 @@
             <a:pPr lvl="2"/>
             <a:r>
               <a:rPr lang="es-ES" sz="2200" b="1" dirty="0" smtClean="0"/>
-              <a:t>Fecha Estimada: </a:t>
-            </a:r>
+              <a:t>Fecha Estimada: 15 de Abril de 2013. </a:t>
+            </a:r>
+            <a:endParaRPr lang="es-ES" sz="2600" dirty="0" smtClean="0"/>
+          </a:p>
+          <a:p>
+            <a:pPr lvl="2"/>
             <a:r>
               <a:rPr lang="es-ES" sz="2200" b="1" dirty="0" smtClean="0"/>
-              <a:t>15 </a:t>
-            </a:r>
-            <a:r>
-              <a:rPr lang="es-ES" sz="2200" b="1" dirty="0" smtClean="0"/>
-              <a:t>de Abril </a:t>
-            </a:r>
-            <a:r>
-              <a:rPr lang="es-ES" sz="2200" b="1" dirty="0" smtClean="0"/>
-              <a:t>de </a:t>
-            </a:r>
-            <a:r>
-              <a:rPr lang="es-ES" sz="2200" b="1" dirty="0" smtClean="0"/>
-              <a:t>2013. </a:t>
-            </a:r>
-            <a:endParaRPr lang="es-ES" sz="2600" dirty="0" smtClean="0"/>
-          </a:p>
-          <a:p>
-            <a:pPr lvl="2"/>
-            <a:r>
-              <a:rPr lang="es-ES" sz="2200" b="1" dirty="0" smtClean="0"/>
-              <a:t>Fecha Entrega : </a:t>
-            </a:r>
-            <a:r>
-              <a:rPr lang="es-ES" sz="2200" b="1" dirty="0" smtClean="0"/>
-              <a:t>1</a:t>
-            </a:r>
-            <a:r>
-              <a:rPr lang="es-ES" sz="2200" b="1" dirty="0" smtClean="0"/>
-              <a:t>9</a:t>
-            </a:r>
-            <a:r>
-              <a:rPr lang="es-ES" sz="2200" b="1" dirty="0" smtClean="0"/>
-              <a:t> </a:t>
-            </a:r>
-            <a:r>
-              <a:rPr lang="es-ES" sz="2200" b="1" dirty="0" smtClean="0"/>
-              <a:t>de Abril </a:t>
-            </a:r>
-            <a:r>
-              <a:rPr lang="es-ES" sz="2200" b="1" dirty="0" smtClean="0"/>
-              <a:t>de </a:t>
-            </a:r>
-            <a:r>
-              <a:rPr lang="es-ES" sz="2200" b="1" dirty="0" smtClean="0"/>
-              <a:t>2013. </a:t>
-            </a:r>
-            <a:endParaRPr lang="es-ES" sz="2200" b="1" dirty="0" smtClean="0"/>
+              <a:t>Fecha Entrega : 19 de Abril de 2013. </a:t>
+            </a:r>
           </a:p>
           <a:p>
             <a:pPr lvl="1"/>
@@ -4838,47 +4801,15 @@
             <a:pPr lvl="2"/>
             <a:r>
               <a:rPr lang="es-ES" sz="2200" b="1" dirty="0" smtClean="0"/>
-              <a:t>Fecha Estimada: 1</a:t>
-            </a:r>
+              <a:t>Fecha Estimada: 19 de Abril de 2013. </a:t>
+            </a:r>
+            <a:endParaRPr lang="es-ES" sz="2600" dirty="0" smtClean="0"/>
+          </a:p>
+          <a:p>
+            <a:pPr lvl="2"/>
             <a:r>
               <a:rPr lang="es-ES" sz="2200" b="1" dirty="0" smtClean="0"/>
-              <a:t>9 </a:t>
-            </a:r>
-            <a:r>
-              <a:rPr lang="es-ES" sz="2200" b="1" dirty="0" smtClean="0"/>
-              <a:t>de Abril </a:t>
-            </a:r>
-            <a:r>
-              <a:rPr lang="es-ES" sz="2200" b="1" dirty="0" smtClean="0"/>
-              <a:t>de </a:t>
-            </a:r>
-            <a:r>
-              <a:rPr lang="es-ES" sz="2200" b="1" dirty="0" smtClean="0"/>
-              <a:t>2013. </a:t>
-            </a:r>
-            <a:endParaRPr lang="es-ES" sz="2600" dirty="0" smtClean="0"/>
-          </a:p>
-          <a:p>
-            <a:pPr lvl="2"/>
-            <a:r>
-              <a:rPr lang="es-ES" sz="2200" b="1" dirty="0" smtClean="0"/>
-              <a:t>Fecha Entrega : </a:t>
-            </a:r>
-            <a:r>
-              <a:rPr lang="es-ES" sz="2200" b="1" dirty="0" smtClean="0"/>
-              <a:t>22 </a:t>
-            </a:r>
-            <a:r>
-              <a:rPr lang="es-ES" sz="2200" b="1" dirty="0" smtClean="0"/>
-              <a:t>de Abril </a:t>
-            </a:r>
-            <a:r>
-              <a:rPr lang="es-ES" sz="2200" b="1" dirty="0" smtClean="0"/>
-              <a:t>de </a:t>
-            </a:r>
-            <a:r>
-              <a:rPr lang="es-ES" sz="2200" b="1" dirty="0" smtClean="0"/>
-              <a:t>2013. </a:t>
+              <a:t>Fecha Entrega : 22 de Abril de 2013. </a:t>
             </a:r>
           </a:p>
           <a:p>
@@ -4926,15 +4857,7 @@
             <a:pPr algn="ctr" fontAlgn="base"/>
             <a:r>
               <a:rPr lang="es-ES" sz="4400" dirty="0" smtClean="0"/>
-              <a:t>Iteración 2</a:t>
-            </a:r>
-            <a:r>
-              <a:rPr lang="es-ES" sz="4400" dirty="0" smtClean="0"/>
-              <a:t>.</a:t>
-            </a:r>
-            <a:r>
-              <a:rPr lang="es-ES" sz="4400" dirty="0" smtClean="0"/>
-              <a:t/>
+              <a:t>Iteración 2.</a:t>
             </a:r>
             <a:br>
               <a:rPr lang="es-ES" sz="4400" dirty="0" smtClean="0"/>
@@ -5007,85 +4930,49 @@
             <a:pPr lvl="1"/>
             <a:r>
               <a:rPr lang="es-ES" sz="2400" dirty="0" smtClean="0"/>
-              <a:t>Primeros </a:t>
-            </a:r>
+              <a:t>Primeros bocetos de interfaz de usuario de la gestión de entrenamientos e interacciones posibles. </a:t>
+            </a:r>
+          </a:p>
+          <a:p>
+            <a:pPr lvl="1"/>
             <a:r>
               <a:rPr lang="es-ES" sz="2400" dirty="0" smtClean="0"/>
-              <a:t>bocetos de interfaz de usuario de la gestión de entrenamientos e interacciones posibles. </a:t>
+              <a:t>Paso de clases a modelo relacional. </a:t>
             </a:r>
           </a:p>
           <a:p>
             <a:pPr lvl="1"/>
             <a:r>
               <a:rPr lang="es-ES" sz="2400" dirty="0" smtClean="0"/>
-              <a:t>Paso </a:t>
-            </a:r>
+              <a:t>Implementación del sistema a partir del Diagrama de Clases obtenido por el equipo de diseño. </a:t>
+            </a:r>
+          </a:p>
+          <a:p>
+            <a:pPr lvl="1"/>
             <a:r>
               <a:rPr lang="es-ES" sz="2400" dirty="0" smtClean="0"/>
-              <a:t>de clases a modelo relacional. </a:t>
+              <a:t>Bocetos de interfaz de usuario de las secciones del sistema correspondientes a “Gestión de Entrenamientos”, y sus interacciones posibles. </a:t>
             </a:r>
           </a:p>
           <a:p>
             <a:pPr lvl="1"/>
             <a:r>
               <a:rPr lang="es-ES" sz="2400" dirty="0" smtClean="0"/>
-              <a:t>Implementación </a:t>
-            </a:r>
+              <a:t>Implementación de las operaciones del sistema realizadas por el equipo de Diseño. </a:t>
+            </a:r>
+          </a:p>
+          <a:p>
+            <a:pPr lvl="1"/>
             <a:r>
               <a:rPr lang="es-ES" sz="2400" dirty="0" smtClean="0"/>
-              <a:t>del sistema a partir del Diagrama de Clases </a:t>
-            </a:r>
+              <a:t>Implementación de la interfaz de usuario. </a:t>
+            </a:r>
+          </a:p>
+          <a:p>
+            <a:pPr lvl="1"/>
             <a:r>
               <a:rPr lang="es-ES" sz="2400" dirty="0" smtClean="0"/>
-              <a:t>obtenido </a:t>
-            </a:r>
-            <a:r>
-              <a:rPr lang="es-ES" sz="2400" dirty="0" smtClean="0"/>
-              <a:t>por el equipo de diseño. </a:t>
-            </a:r>
-          </a:p>
-          <a:p>
-            <a:pPr lvl="1"/>
-            <a:r>
-              <a:rPr lang="es-ES" sz="2400" dirty="0" smtClean="0"/>
-              <a:t>Bocetos </a:t>
-            </a:r>
-            <a:r>
-              <a:rPr lang="es-ES" sz="2400" dirty="0" smtClean="0"/>
-              <a:t>de interfaz de usuario de las secciones del sistema correspondientes a “Gestión de Entrenamientos”, y sus interacciones posibles. </a:t>
-            </a:r>
-          </a:p>
-          <a:p>
-            <a:pPr lvl="1"/>
-            <a:r>
-              <a:rPr lang="es-ES" sz="2400" dirty="0" smtClean="0"/>
-              <a:t>Implementación </a:t>
-            </a:r>
-            <a:r>
-              <a:rPr lang="es-ES" sz="2400" dirty="0" smtClean="0"/>
-              <a:t>de las operaciones del sistema realizadas por el equipo de Diseño. </a:t>
-            </a:r>
-          </a:p>
-          <a:p>
-            <a:pPr lvl="1"/>
-            <a:r>
-              <a:rPr lang="es-ES" sz="2400" dirty="0" smtClean="0"/>
-              <a:t>Implementación </a:t>
-            </a:r>
-            <a:r>
-              <a:rPr lang="es-ES" sz="2400" dirty="0" smtClean="0"/>
-              <a:t>de la interfaz de usuario. </a:t>
-            </a:r>
-          </a:p>
-          <a:p>
-            <a:pPr lvl="1"/>
-            <a:r>
-              <a:rPr lang="es-ES" sz="2400" dirty="0" smtClean="0"/>
-              <a:t>Generar </a:t>
-            </a:r>
-            <a:r>
-              <a:rPr lang="es-ES" sz="2400" dirty="0" smtClean="0"/>
-              <a:t>documentación. </a:t>
+              <a:t>Generar documentación. </a:t>
             </a:r>
             <a:endParaRPr lang="es-ES" sz="2800" dirty="0" smtClean="0"/>
           </a:p>
@@ -5093,19 +4980,7 @@
             <a:pPr lvl="2"/>
             <a:r>
               <a:rPr lang="es-ES" sz="3100" b="1" dirty="0" smtClean="0"/>
-              <a:t>Fecha </a:t>
-            </a:r>
-            <a:r>
-              <a:rPr lang="es-ES" sz="3100" b="1" dirty="0" smtClean="0"/>
-              <a:t>Estimada: </a:t>
-            </a:r>
-            <a:r>
-              <a:rPr lang="es-ES" sz="3100" b="1" dirty="0" smtClean="0"/>
-              <a:t>29 </a:t>
-            </a:r>
-            <a:r>
-              <a:rPr lang="es-ES" sz="3100" b="1" dirty="0" smtClean="0"/>
-              <a:t>de </a:t>
+              <a:t>Fecha Estimada: 29 de </a:t>
             </a:r>
             <a:r>
               <a:rPr lang="es-ES" sz="3200" b="1" dirty="0" smtClean="0"/>
@@ -5113,23 +4988,15 @@
             </a:r>
             <a:r>
               <a:rPr lang="es-ES" sz="3100" b="1" dirty="0" smtClean="0"/>
-              <a:t>de </a:t>
-            </a:r>
+              <a:t>de 2013. </a:t>
+            </a:r>
+            <a:endParaRPr lang="es-ES" sz="3100" dirty="0" smtClean="0"/>
+          </a:p>
+          <a:p>
+            <a:pPr lvl="2"/>
             <a:r>
               <a:rPr lang="es-ES" sz="3100" b="1" dirty="0" smtClean="0"/>
-              <a:t>2013. </a:t>
-            </a:r>
-            <a:endParaRPr lang="es-ES" sz="3100" dirty="0" smtClean="0"/>
-          </a:p>
-          <a:p>
-            <a:pPr lvl="2"/>
-            <a:r>
-              <a:rPr lang="es-ES" sz="3100" b="1" dirty="0" smtClean="0"/>
-              <a:t>Fecha Entrega : 7</a:t>
-            </a:r>
-            <a:r>
-              <a:rPr lang="es-ES" sz="3100" b="1" dirty="0" smtClean="0"/>
-              <a:t> de Junio</a:t>
+              <a:t>Fecha Entrega : 7 de Junio</a:t>
             </a:r>
             <a:r>
               <a:rPr lang="es-ES" sz="3200" b="1" dirty="0" smtClean="0"/>
@@ -5137,11 +5004,7 @@
             </a:r>
             <a:r>
               <a:rPr lang="es-ES" sz="3100" b="1" dirty="0" smtClean="0"/>
-              <a:t>de </a:t>
-            </a:r>
-            <a:r>
-              <a:rPr lang="es-ES" sz="3100" b="1" dirty="0" smtClean="0"/>
-              <a:t>2013. </a:t>
+              <a:t>de 2013. </a:t>
             </a:r>
           </a:p>
           <a:p>
@@ -5199,15 +5062,7 @@
             <a:pPr algn="ctr" fontAlgn="base"/>
             <a:r>
               <a:rPr lang="es-ES" sz="4400" dirty="0" smtClean="0"/>
-              <a:t>Iteración 2</a:t>
-            </a:r>
-            <a:r>
-              <a:rPr lang="es-ES" sz="4400" dirty="0" smtClean="0"/>
-              <a:t>.</a:t>
-            </a:r>
-            <a:r>
-              <a:rPr lang="es-ES" sz="4400" dirty="0" smtClean="0"/>
-              <a:t/>
+              <a:t>Iteración 2.</a:t>
             </a:r>
             <a:br>
               <a:rPr lang="es-ES" sz="4400" dirty="0" smtClean="0"/>
@@ -5303,15 +5158,7 @@
             <a:pPr lvl="1"/>
             <a:r>
               <a:rPr lang="es-ES" sz="2100" dirty="0" smtClean="0"/>
-              <a:t>Las siguientes entregas se realizarán en los días siguientes a las entregas de los </a:t>
-            </a:r>
-            <a:r>
-              <a:rPr lang="es-ES" sz="2100" dirty="0" smtClean="0"/>
-              <a:t>demás equipos</a:t>
-            </a:r>
-            <a:r>
-              <a:rPr lang="es-ES" sz="2100" dirty="0" smtClean="0"/>
-              <a:t>:</a:t>
+              <a:t>Las siguientes entregas se realizarán en los días siguientes a las entregas de los demás equipos:</a:t>
             </a:r>
           </a:p>
           <a:p>
@@ -5347,33 +5194,15 @@
             <a:pPr lvl="2"/>
             <a:r>
               <a:rPr lang="es-ES" sz="2400" b="1" dirty="0" smtClean="0"/>
-              <a:t>Fecha Estimada: </a:t>
-            </a:r>
+              <a:t>Fecha Estimada: 15 de Mayo de 2013. </a:t>
+            </a:r>
+          </a:p>
+          <a:p>
+            <a:pPr lvl="2"/>
             <a:r>
               <a:rPr lang="es-ES" sz="2400" b="1" dirty="0" smtClean="0"/>
-              <a:t>15 </a:t>
-            </a:r>
-            <a:r>
-              <a:rPr lang="es-ES" sz="2400" b="1" dirty="0" smtClean="0"/>
-              <a:t>de Mayo de 2013. </a:t>
-            </a:r>
-            <a:endParaRPr lang="es-ES" sz="2400" b="1" dirty="0" smtClean="0"/>
-          </a:p>
-          <a:p>
-            <a:pPr lvl="2"/>
-            <a:r>
-              <a:rPr lang="es-ES" sz="2400" b="1" dirty="0" smtClean="0"/>
-              <a:t>Fecha Entrega : </a:t>
-            </a:r>
-            <a:r>
-              <a:rPr lang="es-ES" sz="2400" b="1" dirty="0" smtClean="0"/>
-              <a:t>15 </a:t>
-            </a:r>
-            <a:r>
-              <a:rPr lang="es-ES" sz="2400" b="1" dirty="0" smtClean="0"/>
-              <a:t>de Mayo de 2013. </a:t>
-            </a:r>
-            <a:endParaRPr lang="es-ES" sz="2400" b="1" dirty="0" smtClean="0"/>
+              <a:t>Fecha Entrega : 15 de Mayo de 2013. </a:t>
+            </a:r>
           </a:p>
           <a:p>
             <a:pPr lvl="1"/>
@@ -5441,15 +5270,7 @@
             <a:pPr algn="ctr" fontAlgn="base"/>
             <a:r>
               <a:rPr lang="es-ES" sz="4400" dirty="0" smtClean="0"/>
-              <a:t>Iteración 3</a:t>
-            </a:r>
-            <a:r>
-              <a:rPr lang="es-ES" sz="4400" dirty="0" smtClean="0"/>
-              <a:t>.</a:t>
-            </a:r>
-            <a:r>
-              <a:rPr lang="es-ES" sz="4400" dirty="0" smtClean="0"/>
-              <a:t/>
+              <a:t>Iteración 3.</a:t>
             </a:r>
             <a:br>
               <a:rPr lang="es-ES" sz="4400" dirty="0" smtClean="0"/>
@@ -5540,19 +5361,7 @@
             <a:pPr lvl="2"/>
             <a:r>
               <a:rPr lang="es-ES" sz="2200" b="1" dirty="0" smtClean="0"/>
-              <a:t>Fecha </a:t>
-            </a:r>
-            <a:r>
-              <a:rPr lang="es-ES" sz="2200" b="1" dirty="0" smtClean="0"/>
-              <a:t>Entrega : </a:t>
-            </a:r>
-            <a:r>
-              <a:rPr lang="es-ES" sz="2200" b="1" dirty="0" smtClean="0"/>
-              <a:t>17 </a:t>
-            </a:r>
-            <a:r>
-              <a:rPr lang="es-ES" sz="2200" b="1" dirty="0" smtClean="0"/>
-              <a:t>de </a:t>
+              <a:t>Fecha Entrega : 17 de </a:t>
             </a:r>
             <a:r>
               <a:rPr lang="es-ES" sz="2000" b="1" dirty="0" smtClean="0"/>
@@ -5560,13 +5369,8 @@
             </a:r>
             <a:r>
               <a:rPr lang="es-ES" sz="2200" b="1" dirty="0" smtClean="0"/>
-              <a:t>de </a:t>
-            </a:r>
-            <a:r>
-              <a:rPr lang="es-ES" sz="2200" b="1" dirty="0" smtClean="0"/>
-              <a:t>2013. </a:t>
-            </a:r>
-            <a:endParaRPr lang="es-ES" sz="2200" b="1" dirty="0" smtClean="0"/>
+              <a:t>de 2013. </a:t>
+            </a:r>
           </a:p>
           <a:p>
             <a:pPr lvl="1"/>
@@ -5579,15 +5383,7 @@
             <a:pPr lvl="2"/>
             <a:r>
               <a:rPr lang="es-ES" sz="2200" b="1" dirty="0" smtClean="0"/>
-              <a:t>Fecha Estimada: </a:t>
-            </a:r>
-            <a:r>
-              <a:rPr lang="es-ES" sz="2200" b="1" dirty="0" smtClean="0"/>
-              <a:t>19 </a:t>
-            </a:r>
-            <a:r>
-              <a:rPr lang="es-ES" sz="2200" b="1" dirty="0" smtClean="0"/>
-              <a:t>de </a:t>
+              <a:t>Fecha Estimada: 19 de </a:t>
             </a:r>
             <a:r>
               <a:rPr lang="es-ES" sz="2000" b="1" dirty="0" smtClean="0"/>
@@ -5595,27 +5391,15 @@
             </a:r>
             <a:r>
               <a:rPr lang="es-ES" sz="2200" b="1" dirty="0" smtClean="0"/>
-              <a:t>de </a:t>
-            </a:r>
+              <a:t>de 2013. </a:t>
+            </a:r>
+            <a:endParaRPr lang="es-ES" sz="2600" dirty="0" smtClean="0"/>
+          </a:p>
+          <a:p>
+            <a:pPr lvl="2"/>
             <a:r>
               <a:rPr lang="es-ES" sz="2200" b="1" dirty="0" smtClean="0"/>
-              <a:t>2013. </a:t>
-            </a:r>
-            <a:endParaRPr lang="es-ES" sz="2600" dirty="0" smtClean="0"/>
-          </a:p>
-          <a:p>
-            <a:pPr lvl="2"/>
-            <a:r>
-              <a:rPr lang="es-ES" sz="2200" b="1" dirty="0" smtClean="0"/>
-              <a:t>Fecha Entrega : </a:t>
-            </a:r>
-            <a:r>
-              <a:rPr lang="es-ES" sz="2200" b="1" dirty="0" smtClean="0"/>
-              <a:t>22 </a:t>
-            </a:r>
-            <a:r>
-              <a:rPr lang="es-ES" sz="2200" b="1" dirty="0" smtClean="0"/>
-              <a:t>de </a:t>
+              <a:t>Fecha Entrega : 22 de </a:t>
             </a:r>
             <a:r>
               <a:rPr lang="es-ES" sz="2000" b="1" dirty="0" smtClean="0"/>
@@ -5623,13 +5407,8 @@
             </a:r>
             <a:r>
               <a:rPr lang="es-ES" sz="2200" b="1" dirty="0" smtClean="0"/>
-              <a:t>de </a:t>
-            </a:r>
-            <a:r>
-              <a:rPr lang="es-ES" sz="2200" b="1" dirty="0" smtClean="0"/>
-              <a:t>2013. </a:t>
-            </a:r>
-            <a:endParaRPr lang="es-ES" sz="2200" b="1" dirty="0" smtClean="0"/>
+              <a:t>de 2013. </a:t>
+            </a:r>
           </a:p>
           <a:p>
             <a:pPr lvl="1"/>
@@ -5642,15 +5421,7 @@
             <a:pPr lvl="2"/>
             <a:r>
               <a:rPr lang="es-ES" sz="2200" b="1" dirty="0" smtClean="0"/>
-              <a:t>Fecha Estimada: </a:t>
-            </a:r>
-            <a:r>
-              <a:rPr lang="es-ES" sz="2200" b="1" dirty="0" smtClean="0"/>
-              <a:t>22 </a:t>
-            </a:r>
-            <a:r>
-              <a:rPr lang="es-ES" sz="2200" b="1" dirty="0" smtClean="0"/>
-              <a:t>de </a:t>
+              <a:t>Fecha Estimada: 22 de </a:t>
             </a:r>
             <a:r>
               <a:rPr lang="es-ES" sz="2000" b="1" dirty="0" smtClean="0"/>
@@ -5658,27 +5429,15 @@
             </a:r>
             <a:r>
               <a:rPr lang="es-ES" sz="2200" b="1" dirty="0" smtClean="0"/>
-              <a:t>de </a:t>
-            </a:r>
+              <a:t>de 2013. </a:t>
+            </a:r>
+            <a:endParaRPr lang="es-ES" sz="2600" dirty="0" smtClean="0"/>
+          </a:p>
+          <a:p>
+            <a:pPr lvl="2"/>
             <a:r>
               <a:rPr lang="es-ES" sz="2200" b="1" dirty="0" smtClean="0"/>
-              <a:t>2013. </a:t>
-            </a:r>
-            <a:endParaRPr lang="es-ES" sz="2600" dirty="0" smtClean="0"/>
-          </a:p>
-          <a:p>
-            <a:pPr lvl="2"/>
-            <a:r>
-              <a:rPr lang="es-ES" sz="2200" b="1" dirty="0" smtClean="0"/>
-              <a:t>Fecha Entrega : </a:t>
-            </a:r>
-            <a:r>
-              <a:rPr lang="es-ES" sz="2200" b="1" dirty="0" smtClean="0"/>
-              <a:t>24 </a:t>
-            </a:r>
-            <a:r>
-              <a:rPr lang="es-ES" sz="2200" b="1" dirty="0" smtClean="0"/>
-              <a:t>de </a:t>
+              <a:t>Fecha Entrega : 24 de </a:t>
             </a:r>
             <a:r>
               <a:rPr lang="es-ES" sz="2000" b="1" dirty="0" smtClean="0"/>
@@ -5686,13 +5445,8 @@
             </a:r>
             <a:r>
               <a:rPr lang="es-ES" sz="2200" b="1" dirty="0" smtClean="0"/>
-              <a:t>de </a:t>
-            </a:r>
-            <a:r>
-              <a:rPr lang="es-ES" sz="2200" b="1" dirty="0" smtClean="0"/>
-              <a:t>2013. </a:t>
-            </a:r>
-            <a:endParaRPr lang="es-ES" sz="2200" b="1" dirty="0" smtClean="0"/>
+              <a:t>de 2013. </a:t>
+            </a:r>
           </a:p>
           <a:p>
             <a:pPr lvl="1"/>
@@ -5768,15 +5522,7 @@
             <a:pPr algn="ctr" fontAlgn="base"/>
             <a:r>
               <a:rPr lang="es-ES" sz="4400" dirty="0" smtClean="0"/>
-              <a:t>Iteración </a:t>
-            </a:r>
-            <a:r>
-              <a:rPr lang="es-ES" sz="4400" dirty="0" smtClean="0"/>
-              <a:t>3.</a:t>
-            </a:r>
-            <a:r>
-              <a:rPr lang="es-ES" sz="4400" dirty="0" smtClean="0"/>
-              <a:t/>
+              <a:t>Iteración 3.</a:t>
             </a:r>
             <a:br>
               <a:rPr lang="es-ES" sz="4400" dirty="0" smtClean="0"/>
@@ -5849,11 +5595,14 @@
             <a:pPr lvl="1"/>
             <a:r>
               <a:rPr lang="es-ES" sz="1700" dirty="0" smtClean="0"/>
-              <a:t>Presentar </a:t>
-            </a:r>
-            <a:r>
-              <a:rPr lang="es-ES" sz="1700" dirty="0" smtClean="0"/>
-              <a:t>un método para guardar estadísticas de un partido en directo sin conexión a internet, para después volcarlos en la base de datos. </a:t>
+              <a:t>Presentar un método para guardar estadísticas de un partido en directo sin conexión a internet, para después volcarlos en la base de datos. </a:t>
+            </a:r>
+          </a:p>
+          <a:p>
+            <a:pPr lvl="2"/>
+            <a:r>
+              <a:rPr lang="es-ES" sz="1700" b="1" dirty="0" smtClean="0"/>
+              <a:t>Fecha Estimada: 15 de Mayo de 2013. </a:t>
             </a:r>
             <a:endParaRPr lang="es-ES" sz="1700" dirty="0" smtClean="0"/>
           </a:p>
@@ -5861,51 +5610,7 @@
             <a:pPr lvl="2"/>
             <a:r>
               <a:rPr lang="es-ES" sz="1700" b="1" dirty="0" smtClean="0"/>
-              <a:t>Fecha </a:t>
-            </a:r>
-            <a:r>
-              <a:rPr lang="es-ES" sz="1700" b="1" dirty="0" smtClean="0"/>
-              <a:t>Estimada: </a:t>
-            </a:r>
-            <a:r>
-              <a:rPr lang="es-ES" sz="1700" b="1" dirty="0" smtClean="0"/>
-              <a:t>15 </a:t>
-            </a:r>
-            <a:r>
-              <a:rPr lang="es-ES" sz="1700" b="1" dirty="0" smtClean="0"/>
-              <a:t>de Mayo </a:t>
-            </a:r>
-            <a:r>
-              <a:rPr lang="es-ES" sz="1700" b="1" dirty="0" smtClean="0"/>
-              <a:t>de </a:t>
-            </a:r>
-            <a:r>
-              <a:rPr lang="es-ES" sz="1700" b="1" dirty="0" smtClean="0"/>
-              <a:t>2013. </a:t>
-            </a:r>
-            <a:endParaRPr lang="es-ES" sz="1700" dirty="0" smtClean="0"/>
-          </a:p>
-          <a:p>
-            <a:pPr lvl="2"/>
-            <a:r>
-              <a:rPr lang="es-ES" sz="1700" b="1" dirty="0" smtClean="0"/>
-              <a:t>Fecha Entrega : </a:t>
-            </a:r>
-            <a:r>
-              <a:rPr lang="es-ES" sz="1700" b="1" dirty="0" smtClean="0"/>
-              <a:t>15 de </a:t>
-            </a:r>
-            <a:r>
-              <a:rPr lang="es-ES" sz="1700" b="1" dirty="0" smtClean="0"/>
-              <a:t>Mayo </a:t>
-            </a:r>
-            <a:r>
-              <a:rPr lang="es-ES" sz="1700" b="1" dirty="0" smtClean="0"/>
-              <a:t>de </a:t>
-            </a:r>
-            <a:r>
-              <a:rPr lang="es-ES" sz="1700" b="1" dirty="0" smtClean="0"/>
-              <a:t>2013. </a:t>
+              <a:t>Fecha Entrega : 15 de Mayo de 2013. </a:t>
             </a:r>
             <a:endParaRPr lang="es-ES" sz="1700" dirty="0" smtClean="0"/>
           </a:p>
@@ -5920,11 +5625,58 @@
             <a:pPr lvl="1"/>
             <a:r>
               <a:rPr lang="es-ES" sz="1700" dirty="0" smtClean="0"/>
-              <a:t>Implementación </a:t>
-            </a:r>
+              <a:t>Implementación del acceso remoto a la BD. </a:t>
+            </a:r>
+          </a:p>
+          <a:p>
+            <a:pPr lvl="2"/>
+            <a:r>
+              <a:rPr lang="es-ES" sz="1700" b="1" dirty="0" smtClean="0"/>
+              <a:t>Fecha Estimada: 22 de Mayo de 2013. </a:t>
+            </a:r>
+            <a:endParaRPr lang="es-ES" sz="1700" dirty="0" smtClean="0"/>
+          </a:p>
+          <a:p>
+            <a:pPr lvl="2"/>
+            <a:r>
+              <a:rPr lang="es-ES" sz="1700" b="1" dirty="0" smtClean="0"/>
+              <a:t>Fecha Entrega : 22 de Mayo de 2013. </a:t>
+            </a:r>
+            <a:endParaRPr lang="es-ES" sz="1700" dirty="0" smtClean="0"/>
+          </a:p>
+          <a:p>
+            <a:pPr lvl="1"/>
             <a:r>
               <a:rPr lang="es-ES" sz="1700" dirty="0" smtClean="0"/>
-              <a:t>del acceso remoto a la BD. </a:t>
+              <a:t>Implementación del sistema a partir del nuevo Diagrama de Clases obtenido por el equipo de diseño. </a:t>
+            </a:r>
+          </a:p>
+          <a:p>
+            <a:pPr lvl="1"/>
+            <a:r>
+              <a:rPr lang="es-ES" sz="1700" dirty="0" smtClean="0"/>
+              <a:t>Implementación de las operaciones del sistema realizadas por el equipo de Diseño. </a:t>
+            </a:r>
+          </a:p>
+          <a:p>
+            <a:pPr lvl="1"/>
+            <a:r>
+              <a:rPr lang="es-ES" sz="1700" dirty="0" smtClean="0"/>
+              <a:t>Implementación de la interfaz de usuario. </a:t>
+            </a:r>
+          </a:p>
+          <a:p>
+            <a:pPr lvl="1"/>
+            <a:r>
+              <a:rPr lang="es-ES" sz="1700" dirty="0" smtClean="0"/>
+              <a:t>Generar documentación. </a:t>
+            </a:r>
+          </a:p>
+          <a:p>
+            <a:pPr lvl="2"/>
+            <a:r>
+              <a:rPr lang="es-ES" sz="1700" b="1" dirty="0" smtClean="0"/>
+              <a:t>Fecha Estimada: 1 de Junio de 2013. </a:t>
             </a:r>
             <a:endParaRPr lang="es-ES" sz="1700" dirty="0" smtClean="0"/>
           </a:p>
@@ -5932,124 +5684,7 @@
             <a:pPr lvl="2"/>
             <a:r>
               <a:rPr lang="es-ES" sz="1700" b="1" dirty="0" smtClean="0"/>
-              <a:t>Fecha Estimada: </a:t>
-            </a:r>
-            <a:r>
-              <a:rPr lang="es-ES" sz="1700" b="1" dirty="0" smtClean="0"/>
-              <a:t>22 </a:t>
-            </a:r>
-            <a:r>
-              <a:rPr lang="es-ES" sz="1700" b="1" dirty="0" smtClean="0"/>
-              <a:t>de Mayo de 2013. </a:t>
-            </a:r>
-            <a:endParaRPr lang="es-ES" sz="1700" dirty="0" smtClean="0"/>
-          </a:p>
-          <a:p>
-            <a:pPr lvl="2"/>
-            <a:r>
-              <a:rPr lang="es-ES" sz="1700" b="1" dirty="0" smtClean="0"/>
-              <a:t>Fecha Entrega : </a:t>
-            </a:r>
-            <a:r>
-              <a:rPr lang="es-ES" sz="1700" b="1" dirty="0" smtClean="0"/>
-              <a:t>22 </a:t>
-            </a:r>
-            <a:r>
-              <a:rPr lang="es-ES" sz="1700" b="1" dirty="0" smtClean="0"/>
-              <a:t>de Mayo de 2013. </a:t>
-            </a:r>
-            <a:endParaRPr lang="es-ES" sz="1700" dirty="0" smtClean="0"/>
-          </a:p>
-          <a:p>
-            <a:pPr lvl="1"/>
-            <a:r>
-              <a:rPr lang="es-ES" sz="1700" dirty="0" smtClean="0"/>
-              <a:t>Implementación </a:t>
-            </a:r>
-            <a:r>
-              <a:rPr lang="es-ES" sz="1700" dirty="0" smtClean="0"/>
-              <a:t>del sistema a partir del nuevo Diagrama de Clases obtenido por el equipo de diseño. </a:t>
-            </a:r>
-          </a:p>
-          <a:p>
-            <a:pPr lvl="1"/>
-            <a:r>
-              <a:rPr lang="es-ES" sz="1700" dirty="0" smtClean="0"/>
-              <a:t>Implementación </a:t>
-            </a:r>
-            <a:r>
-              <a:rPr lang="es-ES" sz="1700" dirty="0" smtClean="0"/>
-              <a:t>de las operaciones del sistema realizadas por el equipo de Diseño. </a:t>
-            </a:r>
-          </a:p>
-          <a:p>
-            <a:pPr lvl="1"/>
-            <a:r>
-              <a:rPr lang="es-ES" sz="1700" dirty="0" smtClean="0"/>
-              <a:t>Implementación </a:t>
-            </a:r>
-            <a:r>
-              <a:rPr lang="es-ES" sz="1700" dirty="0" smtClean="0"/>
-              <a:t>de la interfaz de usuario. </a:t>
-            </a:r>
-          </a:p>
-          <a:p>
-            <a:pPr lvl="1"/>
-            <a:r>
-              <a:rPr lang="es-ES" sz="1700" dirty="0" smtClean="0"/>
-              <a:t>Generar </a:t>
-            </a:r>
-            <a:r>
-              <a:rPr lang="es-ES" sz="1700" dirty="0" smtClean="0"/>
-              <a:t>documentación. </a:t>
-            </a:r>
-            <a:endParaRPr lang="es-ES" sz="1700" dirty="0" smtClean="0"/>
-          </a:p>
-          <a:p>
-            <a:pPr lvl="2"/>
-            <a:r>
-              <a:rPr lang="es-ES" sz="1700" b="1" dirty="0" smtClean="0"/>
-              <a:t>Fecha Estimada: 1</a:t>
-            </a:r>
-            <a:r>
-              <a:rPr lang="es-ES" sz="1700" b="1" dirty="0" smtClean="0"/>
-              <a:t> </a:t>
-            </a:r>
-            <a:r>
-              <a:rPr lang="es-ES" sz="1700" b="1" dirty="0" smtClean="0"/>
-              <a:t>de </a:t>
-            </a:r>
-            <a:r>
-              <a:rPr lang="es-ES" sz="1700" b="1" dirty="0" smtClean="0"/>
-              <a:t>Junio de </a:t>
-            </a:r>
-            <a:r>
-              <a:rPr lang="es-ES" sz="1700" b="1" dirty="0" smtClean="0"/>
-              <a:t>2013. </a:t>
-            </a:r>
-            <a:endParaRPr lang="es-ES" sz="1700" dirty="0" smtClean="0"/>
-          </a:p>
-          <a:p>
-            <a:pPr lvl="2"/>
-            <a:r>
-              <a:rPr lang="es-ES" sz="1700" b="1" dirty="0" smtClean="0"/>
-              <a:t>Fecha Entrega : 7</a:t>
-            </a:r>
-            <a:r>
-              <a:rPr lang="es-ES" sz="1700" b="1" dirty="0" smtClean="0"/>
-              <a:t> </a:t>
-            </a:r>
-            <a:r>
-              <a:rPr lang="es-ES" sz="1700" b="1" dirty="0" smtClean="0"/>
-              <a:t>de </a:t>
-            </a:r>
-            <a:r>
-              <a:rPr lang="es-ES" sz="1700" b="1" dirty="0" smtClean="0"/>
-              <a:t>Junio </a:t>
-            </a:r>
-            <a:r>
-              <a:rPr lang="es-ES" sz="1700" b="1" dirty="0" smtClean="0"/>
-              <a:t>de 2013. </a:t>
+              <a:t>Fecha Entrega : 7 de Junio de 2013. </a:t>
             </a:r>
             <a:endParaRPr lang="es-ES" sz="1700" dirty="0" smtClean="0"/>
           </a:p>
@@ -6116,15 +5751,7 @@
             <a:pPr algn="ctr" fontAlgn="base"/>
             <a:r>
               <a:rPr lang="es-ES" sz="4400" dirty="0" smtClean="0"/>
-              <a:t>Iteración </a:t>
-            </a:r>
-            <a:r>
-              <a:rPr lang="es-ES" sz="4400" dirty="0" smtClean="0"/>
-              <a:t>3.</a:t>
-            </a:r>
-            <a:r>
-              <a:rPr lang="es-ES" sz="4400" dirty="0" smtClean="0"/>
-              <a:t/>
+              <a:t>Iteración 3.</a:t>
             </a:r>
             <a:br>
               <a:rPr lang="es-ES" sz="4400" dirty="0" smtClean="0"/>
@@ -6337,7 +5964,6 @@
               <a:rPr lang="es-ES" sz="1600" dirty="0"/>
               <a:t>de grupos de entrenamiento. </a:t>
             </a:r>
-            <a:endParaRPr lang="es-ES" sz="1600" dirty="0"/>
           </a:p>
           <a:p>
             <a:pPr marL="1078992" lvl="2" indent="-228600">
@@ -6389,7 +6015,6 @@
               <a:rPr lang="es-ES" sz="1600" dirty="0"/>
               <a:t>de actividades. </a:t>
             </a:r>
-            <a:endParaRPr lang="es-ES" sz="1600" dirty="0"/>
           </a:p>
           <a:p>
             <a:pPr marL="1078992" lvl="2" indent="-228600">
@@ -6413,7 +6038,6 @@
               <a:rPr lang="es-ES" sz="1600" dirty="0"/>
               <a:t>de temporadas. </a:t>
             </a:r>
-            <a:endParaRPr lang="es-ES" sz="1600" dirty="0"/>
           </a:p>
           <a:p>
             <a:pPr marL="1078992" lvl="2" indent="-228600">
@@ -7154,7 +6778,6 @@
               <a:rPr lang="es-ES" sz="2000" dirty="0"/>
               <a:t>y repartirnos su trabajo.</a:t>
             </a:r>
-            <a:endParaRPr lang="es-ES" sz="2000" dirty="0"/>
           </a:p>
           <a:p>
             <a:endParaRPr lang="es-ES" b="1" dirty="0"/>
@@ -7632,11 +7255,6 @@
               </a:rPr>
               <a:t>Cambios en la Base de Datos:</a:t>
             </a:r>
-            <a:endParaRPr lang="es-ES" dirty="0" smtClean="0">
-              <a:solidFill>
-                <a:prstClr val="black"/>
-              </a:solidFill>
-            </a:endParaRPr>
           </a:p>
           <a:p>
             <a:pPr lvl="2" fontAlgn="base">
@@ -7646,7 +7264,6 @@
               <a:rPr lang="es-ES" dirty="0" smtClean="0"/>
               <a:t>Cada vez que debíamos hacer un pequeño cambio en la Base de Datos, nos suponía grandes modificaciones en la implementación de la interfaz.</a:t>
             </a:r>
-            <a:endParaRPr lang="es-ES" dirty="0" smtClean="0"/>
           </a:p>
           <a:p>
             <a:endParaRPr lang="es-ES" dirty="0"/>
@@ -7738,15 +7355,7 @@
             <a:pPr lvl="1"/>
             <a:r>
               <a:rPr lang="es-ES" sz="1700" dirty="0" smtClean="0"/>
-              <a:t>En un principio creamos un diagrama de clases entre todos los integrantes de todos los subgrupos, en el cual recogimos las principales entidades que </a:t>
-            </a:r>
-            <a:r>
-              <a:rPr lang="es-ES" sz="1700" dirty="0" smtClean="0"/>
-              <a:t>í</a:t>
-            </a:r>
-            <a:r>
-              <a:rPr lang="es-ES" sz="1700" dirty="0" smtClean="0"/>
-              <a:t>bamos a tener en nuestro sistema. Diseñamos un diagrama de clases bastante completo, solo le faltaba la clase liga.</a:t>
+              <a:t>En un principio creamos un diagrama de clases entre todos los integrantes de todos los subgrupos, en el cual recogimos las principales entidades que íbamos a tener en nuestro sistema. Diseñamos un diagrama de clases bastante completo, solo le faltaba la clase liga.</a:t>
             </a:r>
           </a:p>
           <a:p>
@@ -7755,26 +7364,19 @@
               <a:rPr lang="es-ES" sz="1700" dirty="0" smtClean="0"/>
               <a:t>En la tercera iteración, cuando estábamos desarrollando la Gestión de Partidos nos dimos cuenta de que solo podían jugar partidos los equipos que haya dentro de una misma liga. Entonces nos dimos cuenta que nos faltaba en el diagrama de clases la clase Liga, y de que teníamos que añadirle al sistema una Gestión de Ligas.</a:t>
             </a:r>
-            <a:endParaRPr lang="es-ES" sz="1700" dirty="0" smtClean="0"/>
           </a:p>
           <a:p>
             <a:r>
               <a:rPr lang="es-ES" sz="2100" dirty="0" smtClean="0"/>
               <a:t>No haber tomado medidas antes con los retrasos del compañero:</a:t>
             </a:r>
-            <a:endParaRPr lang="es-ES" sz="2100" dirty="0" smtClean="0"/>
           </a:p>
           <a:p>
             <a:pPr lvl="1"/>
             <a:r>
               <a:rPr lang="es-ES" sz="1700" dirty="0" smtClean="0"/>
-              <a:t>L</a:t>
-            </a:r>
-            <a:r>
-              <a:rPr lang="es-ES" sz="1700" dirty="0" smtClean="0"/>
-              <a:t>os retrasos del compañero que abandonó el equipo venían de la segunda iteración. Hasta la mitad de la tercera iteración no nos confirmó que iba a dejar la asignatura por falta de tiempo. Por lo que estuvimos esperando demasiado tiempo su trabajo, mientras que debíamos haberlo repartido entre todos antes.</a:t>
-            </a:r>
-            <a:endParaRPr lang="es-ES" sz="1700" dirty="0" smtClean="0"/>
+              <a:t>Los retrasos del compañero que abandonó el equipo venían de la segunda iteración. Hasta la mitad de la tercera iteración no nos confirmó que iba a dejar la asignatura por falta de tiempo. Por lo que estuvimos esperando demasiado tiempo su trabajo, mientras que debíamos haberlo repartido entre todos antes.</a:t>
+            </a:r>
           </a:p>
           <a:p>
             <a:pPr lvl="1"/>
@@ -7900,30 +7502,65 @@
             <p:ph idx="1"/>
           </p:nvPr>
         </p:nvSpPr>
-        <p:spPr/>
-        <p:txBody>
-          <a:bodyPr/>
+        <p:spPr>
+          <a:xfrm>
+            <a:off x="457200" y="1142984"/>
+            <a:ext cx="8229600" cy="5357850"/>
+          </a:xfrm>
+        </p:spPr>
+        <p:txBody>
+          <a:bodyPr>
+            <a:normAutofit/>
+          </a:bodyPr>
           <a:lstStyle/>
           <a:p>
             <a:r>
-              <a:rPr lang="es-ES" dirty="0" smtClean="0"/>
-              <a:t>Ante el abandono </a:t>
-            </a:r>
-            <a:r>
-              <a:rPr lang="es-ES" dirty="0" smtClean="0"/>
-              <a:t>de un compañero del </a:t>
-            </a:r>
-            <a:r>
-              <a:rPr lang="es-ES" dirty="0" smtClean="0"/>
-              <a:t>equipo.</a:t>
+              <a:rPr lang="es-ES" sz="2100" dirty="0" smtClean="0"/>
+              <a:t>No haber sabido aprovechar el trabajo ya hecho por otros compañeros.</a:t>
             </a:r>
           </a:p>
           <a:p>
             <a:pPr lvl="1"/>
             <a:r>
-              <a:rPr lang="es-ES" dirty="0" smtClean="0"/>
-              <a:t>Ante el problema que nos surgió cuando uno de los compañeros del equipo abandonó el proyecto, no nos quedó más remedio que repartirnos entre todos su parte del trabajo: tanto su parte de implementación, como su parte de diseño.</a:t>
-            </a:r>
+              <a:rPr lang="es-ES" sz="2000" dirty="0" smtClean="0"/>
+              <a:t>Si se hubiese aprovechado más el trabajo de la primera implementación, todo el trabajo hubiese sido más rápido y </a:t>
+            </a:r>
+            <a:r>
+              <a:rPr lang="es-ES" sz="2000" smtClean="0"/>
+              <a:t>eficaz. </a:t>
+            </a:r>
+            <a:endParaRPr lang="es-ES" sz="2000" dirty="0" smtClean="0"/>
+          </a:p>
+          <a:p>
+            <a:pPr lvl="1"/>
+            <a:endParaRPr lang="es-ES" sz="1600" dirty="0" smtClean="0"/>
+          </a:p>
+          <a:p>
+            <a:pPr lvl="2"/>
+            <a:endParaRPr lang="es-ES" sz="2200" dirty="0" smtClean="0"/>
+          </a:p>
+          <a:p>
+            <a:endParaRPr lang="es-ES" sz="2800" dirty="0" smtClean="0"/>
+          </a:p>
+          <a:p>
+            <a:endParaRPr lang="es-ES" sz="2800" dirty="0" smtClean="0"/>
+          </a:p>
+          <a:p>
+            <a:pPr lvl="1"/>
+            <a:endParaRPr lang="es-ES" sz="2400" b="1" dirty="0" smtClean="0"/>
+          </a:p>
+          <a:p>
+            <a:endParaRPr lang="es-ES" sz="2800" dirty="0" smtClean="0"/>
+          </a:p>
+          <a:p>
+            <a:endParaRPr lang="es-ES" sz="2800" dirty="0" smtClean="0"/>
+          </a:p>
+          <a:p>
+            <a:pPr lvl="1"/>
+            <a:endParaRPr lang="es-ES" sz="2400" b="1" dirty="0" smtClean="0"/>
+          </a:p>
+          <a:p>
+            <a:pPr lvl="1"/>
             <a:endParaRPr lang="es-ES" dirty="0"/>
           </a:p>
         </p:txBody>
@@ -7938,22 +7575,48 @@
             <p:ph type="title"/>
           </p:nvPr>
         </p:nvSpPr>
-        <p:spPr/>
+        <p:spPr>
+          <a:xfrm>
+            <a:off x="428596" y="1500174"/>
+            <a:ext cx="8229600" cy="45719"/>
+          </a:xfrm>
+        </p:spPr>
         <p:txBody>
           <a:bodyPr>
             <a:normAutofit fontScale="90000"/>
           </a:bodyPr>
           <a:lstStyle/>
           <a:p>
-            <a:pPr algn="ctr"/>
+            <a:pPr algn="ctr" fontAlgn="base"/>
+            <a:r>
+              <a:rPr lang="es-ES" sz="4400" dirty="0" smtClean="0"/>
+              <a:t>Errores cometidos</a:t>
+            </a:r>
+            <a:br>
+              <a:rPr lang="es-ES" sz="4400" dirty="0" smtClean="0"/>
+            </a:br>
+            <a:r>
+              <a:rPr lang="es-ES" sz="4400" dirty="0" smtClean="0"/>
+              <a:t/>
+            </a:r>
+            <a:br>
+              <a:rPr lang="es-ES" sz="4400" dirty="0" smtClean="0"/>
+            </a:br>
+            <a:r>
+              <a:rPr lang="es-ES" sz="4400" dirty="0" smtClean="0"/>
+              <a:t/>
+            </a:r>
+            <a:br>
+              <a:rPr lang="es-ES" sz="4400" dirty="0" smtClean="0"/>
+            </a:br>
             <a:r>
               <a:rPr lang="es-ES" dirty="0" smtClean="0"/>
-              <a:t>Soluciones adoptadas</a:t>
+              <a:t/>
             </a:r>
             <a:br>
               <a:rPr lang="es-ES" dirty="0" smtClean="0"/>
             </a:br>
-            <a:endParaRPr lang="es-ES" dirty="0"/>
+            <a:endParaRPr lang="es-ES" dirty="0" smtClean="0"/>
           </a:p>
         </p:txBody>
       </p:sp>
@@ -8018,7 +7681,6 @@
               <a:rPr lang="es-ES" dirty="0" smtClean="0"/>
               <a:t>Trabajo de cada Subgrupo</a:t>
             </a:r>
-            <a:endParaRPr lang="es-ES" dirty="0" smtClean="0"/>
           </a:p>
           <a:p>
             <a:pPr fontAlgn="base"/>
@@ -8026,19 +7688,13 @@
               <a:rPr lang="es-ES" dirty="0" smtClean="0"/>
               <a:t>Planificación</a:t>
             </a:r>
-            <a:endParaRPr lang="es-ES" dirty="0" smtClean="0"/>
           </a:p>
           <a:p>
             <a:pPr lvl="1" fontAlgn="base"/>
             <a:r>
               <a:rPr lang="es-ES" dirty="0" smtClean="0"/>
-              <a:t>Diferencia </a:t>
-            </a:r>
-            <a:r>
-              <a:rPr lang="es-ES" dirty="0" smtClean="0"/>
-              <a:t>entre Fechas Estimadas vs Fechas de Entrega</a:t>
-            </a:r>
-            <a:endParaRPr lang="es-ES" dirty="0" smtClean="0"/>
+              <a:t>Diferencia entre Fechas Estimadas vs Fechas de Entrega</a:t>
+            </a:r>
           </a:p>
           <a:p>
             <a:pPr fontAlgn="base"/>
@@ -8046,7 +7702,6 @@
               <a:rPr lang="es-ES" dirty="0" smtClean="0"/>
               <a:t>Cambios en la planificación</a:t>
             </a:r>
-            <a:endParaRPr lang="es-ES" dirty="0" smtClean="0"/>
           </a:p>
           <a:p>
             <a:pPr fontAlgn="base"/>
@@ -8059,23 +7714,14 @@
             <a:pPr fontAlgn="base"/>
             <a:r>
               <a:rPr lang="es-ES" dirty="0" smtClean="0"/>
-              <a:t>Errores </a:t>
-            </a:r>
+              <a:t>Errores cometidos</a:t>
+            </a:r>
+          </a:p>
+          <a:p>
+            <a:pPr fontAlgn="base"/>
             <a:r>
               <a:rPr lang="es-ES" dirty="0" smtClean="0"/>
-              <a:t>cometidos</a:t>
-            </a:r>
-            <a:endParaRPr lang="es-ES" dirty="0" smtClean="0"/>
-          </a:p>
-          <a:p>
-            <a:pPr fontAlgn="base"/>
-            <a:r>
-              <a:rPr lang="es-ES" dirty="0" smtClean="0"/>
-              <a:t>Soluciones </a:t>
-            </a:r>
-            <a:r>
-              <a:rPr lang="es-ES" dirty="0" smtClean="0"/>
-              <a:t>adoptadas</a:t>
+              <a:t>Soluciones adoptadas</a:t>
             </a:r>
           </a:p>
           <a:p>
@@ -8084,7 +7730,6 @@
               <a:rPr lang="es-ES" dirty="0" smtClean="0"/>
               <a:t>Demo de la aplicación</a:t>
             </a:r>
-            <a:endParaRPr lang="es-ES" dirty="0" smtClean="0"/>
           </a:p>
           <a:p>
             <a:endParaRPr lang="es-ES" dirty="0"/>
@@ -8157,6 +7802,90 @@
           <a:p>
             <a:r>
               <a:rPr lang="es-ES" dirty="0" smtClean="0"/>
+              <a:t>Ante el abandono de un compañero del equipo.</a:t>
+            </a:r>
+          </a:p>
+          <a:p>
+            <a:pPr lvl="1"/>
+            <a:r>
+              <a:rPr lang="es-ES" dirty="0" smtClean="0"/>
+              <a:t>Ante el problema que nos surgió cuando uno de los compañeros del equipo abandonó el proyecto, no nos quedó más remedio que repartirnos entre todos su parte del trabajo: tanto su parte de implementación, como su parte de diseño.</a:t>
+            </a:r>
+            <a:endParaRPr lang="es-ES" dirty="0"/>
+          </a:p>
+        </p:txBody>
+      </p:sp>
+      <p:sp>
+        <p:nvSpPr>
+          <p:cNvPr id="3" name="2 Título"/>
+          <p:cNvSpPr>
+            <a:spLocks noGrp="1"/>
+          </p:cNvSpPr>
+          <p:nvPr>
+            <p:ph type="title"/>
+          </p:nvPr>
+        </p:nvSpPr>
+        <p:spPr/>
+        <p:txBody>
+          <a:bodyPr>
+            <a:normAutofit fontScale="90000"/>
+          </a:bodyPr>
+          <a:lstStyle/>
+          <a:p>
+            <a:pPr algn="ctr"/>
+            <a:r>
+              <a:rPr lang="es-ES" dirty="0" smtClean="0"/>
+              <a:t>Soluciones adoptadas</a:t>
+            </a:r>
+            <a:br>
+              <a:rPr lang="es-ES" dirty="0" smtClean="0"/>
+            </a:br>
+            <a:endParaRPr lang="es-ES" dirty="0"/>
+          </a:p>
+        </p:txBody>
+      </p:sp>
+    </p:spTree>
+  </p:cSld>
+  <p:clrMapOvr>
+    <a:masterClrMapping/>
+  </p:clrMapOvr>
+</p:sld>
+</file>
+
+<file path=ppt/slides/slide21.xml><?xml version="1.0" encoding="utf-8"?>
+<p:sld xmlns:a="http://schemas.openxmlformats.org/drawingml/2006/main" xmlns:r="http://schemas.openxmlformats.org/officeDocument/2006/relationships" xmlns:p="http://schemas.openxmlformats.org/presentationml/2006/main">
+  <p:cSld>
+    <p:spTree>
+      <p:nvGrpSpPr>
+        <p:cNvPr id="1" name=""/>
+        <p:cNvGrpSpPr/>
+        <p:nvPr/>
+      </p:nvGrpSpPr>
+      <p:grpSpPr>
+        <a:xfrm>
+          <a:off x="0" y="0"/>
+          <a:ext cx="0" cy="0"/>
+          <a:chOff x="0" y="0"/>
+          <a:chExt cx="0" cy="0"/>
+        </a:xfrm>
+      </p:grpSpPr>
+      <p:sp>
+        <p:nvSpPr>
+          <p:cNvPr id="2" name="1 Marcador de contenido"/>
+          <p:cNvSpPr>
+            <a:spLocks noGrp="1"/>
+          </p:cNvSpPr>
+          <p:nvPr>
+            <p:ph idx="1"/>
+          </p:nvPr>
+        </p:nvSpPr>
+        <p:spPr/>
+        <p:txBody>
+          <a:bodyPr/>
+          <a:lstStyle/>
+          <a:p>
+            <a:r>
+              <a:rPr lang="es-ES" dirty="0" smtClean="0"/>
               <a:t>Ahora procederemos a mostrarles el funcionamiento de la aplicación que hemos diseñado.</a:t>
             </a:r>
             <a:endParaRPr lang="es-ES" dirty="0"/>
@@ -8237,15 +7966,7 @@
             <a:pPr fontAlgn="base"/>
             <a:r>
               <a:rPr lang="es-ES" dirty="0" smtClean="0"/>
-              <a:t>Miembros </a:t>
-            </a:r>
-            <a:r>
-              <a:rPr lang="es-ES" dirty="0" smtClean="0"/>
-              <a:t>de cada </a:t>
-            </a:r>
-            <a:r>
-              <a:rPr lang="es-ES" dirty="0" smtClean="0"/>
-              <a:t>Subgrupo</a:t>
+              <a:t>Miembros de cada Subgrupo</a:t>
             </a:r>
           </a:p>
           <a:p>
@@ -8280,22 +8001,14 @@
             <a:pPr lvl="1" fontAlgn="base"/>
             <a:r>
               <a:rPr lang="es-ES" dirty="0" smtClean="0"/>
-              <a:t>Subgrupo </a:t>
-            </a:r>
-            <a:r>
-              <a:rPr lang="es-ES" dirty="0" smtClean="0"/>
-              <a:t>2</a:t>
+              <a:t>Subgrupo 2</a:t>
             </a:r>
           </a:p>
           <a:p>
             <a:pPr lvl="2" fontAlgn="base"/>
             <a:r>
               <a:rPr lang="es-ES" sz="2000" dirty="0" smtClean="0"/>
-              <a:t>Moisés </a:t>
-            </a:r>
-            <a:r>
-              <a:rPr lang="es-ES" sz="2000" dirty="0" smtClean="0"/>
-              <a:t>Gautier Gómez </a:t>
+              <a:t>Moisés Gautier Gómez </a:t>
             </a:r>
           </a:p>
           <a:p>
@@ -8311,7 +8024,6 @@
               <a:rPr lang="es-ES" sz="2200" dirty="0" smtClean="0"/>
               <a:t>Julio Ros Martínez </a:t>
             </a:r>
-            <a:endParaRPr lang="es-ES" sz="2200" dirty="0" smtClean="0"/>
           </a:p>
           <a:p>
             <a:pPr lvl="1" fontAlgn="base">
@@ -9040,27 +8752,7 @@
             <a:pPr algn="ctr" fontAlgn="base"/>
             <a:r>
               <a:rPr lang="es-ES" dirty="0" smtClean="0"/>
-              <a:t>Planificación: </a:t>
-            </a:r>
-            <a:r>
-              <a:rPr lang="es-ES" dirty="0" smtClean="0"/>
-              <a:t>Diferencia </a:t>
-            </a:r>
-            <a:r>
-              <a:rPr lang="es-ES" dirty="0" smtClean="0"/>
-              <a:t>entre </a:t>
-            </a:r>
-            <a:r>
-              <a:rPr lang="es-ES" dirty="0" smtClean="0"/>
-              <a:t>Fechas Estimadas vs Fechas </a:t>
-            </a:r>
-            <a:r>
-              <a:rPr lang="es-ES" dirty="0" smtClean="0"/>
-              <a:t>de Entrega</a:t>
-            </a:r>
-            <a:r>
-              <a:rPr lang="es-ES" dirty="0" smtClean="0"/>
-              <a:t/>
+              <a:t>Planificación: Diferencia entre Fechas Estimadas vs Fechas de Entrega</a:t>
             </a:r>
             <a:br>
               <a:rPr lang="es-ES" dirty="0" smtClean="0"/>
@@ -9121,33 +8813,21 @@
             <a:pPr lvl="1"/>
             <a:r>
               <a:rPr lang="es-ES" sz="2400" dirty="0" smtClean="0"/>
-              <a:t>Planificación </a:t>
-            </a:r>
+              <a:t>Planificación de recursos y tareas para la primera iteración. </a:t>
+            </a:r>
+          </a:p>
+          <a:p>
+            <a:pPr lvl="1"/>
             <a:r>
               <a:rPr lang="es-ES" sz="2400" dirty="0" smtClean="0"/>
-              <a:t>de recursos y tareas para la primera iteración. </a:t>
+              <a:t>Creación de diagramas de tiempos (Gantt). </a:t>
             </a:r>
           </a:p>
           <a:p>
             <a:pPr lvl="1"/>
             <a:r>
               <a:rPr lang="es-ES" sz="2400" dirty="0" smtClean="0"/>
-              <a:t>Creación </a:t>
-            </a:r>
-            <a:r>
-              <a:rPr lang="es-ES" sz="2400" dirty="0" smtClean="0"/>
-              <a:t>de diagramas de tiempos (Gantt). </a:t>
-            </a:r>
-          </a:p>
-          <a:p>
-            <a:pPr lvl="1"/>
-            <a:r>
-              <a:rPr lang="es-ES" sz="2400" dirty="0" smtClean="0"/>
-              <a:t>Creación </a:t>
-            </a:r>
-            <a:r>
-              <a:rPr lang="es-ES" sz="2400" dirty="0" smtClean="0"/>
-              <a:t>de la red de tareas (</a:t>
+              <a:t>Creación de la red de tareas (</a:t>
             </a:r>
             <a:r>
               <a:rPr lang="es-ES" sz="2400" dirty="0" err="1" smtClean="0"/>
@@ -9162,13 +8842,8 @@
             <a:pPr lvl="1"/>
             <a:r>
               <a:rPr lang="es-ES" sz="2400" dirty="0" smtClean="0"/>
-              <a:t>Revisión </a:t>
-            </a:r>
-            <a:r>
-              <a:rPr lang="es-ES" sz="2400" dirty="0" smtClean="0"/>
-              <a:t>de los documentos de los equipos de Diseño e Implementación. </a:t>
-            </a:r>
-            <a:endParaRPr lang="es-ES" sz="2400" dirty="0" smtClean="0"/>
+              <a:t>Revisión de los documentos de los equipos de Diseño e Implementación. </a:t>
+            </a:r>
           </a:p>
           <a:p>
             <a:pPr lvl="1"/>
@@ -9321,21 +8996,8 @@
             <a:pPr lvl="2"/>
             <a:r>
               <a:rPr lang="es-ES" sz="2200" b="1" dirty="0" smtClean="0"/>
-              <a:t>Fecha </a:t>
-            </a:r>
-            <a:r>
-              <a:rPr lang="es-ES" sz="2200" b="1" dirty="0" smtClean="0"/>
-              <a:t>Entrega : </a:t>
-            </a:r>
-            <a:r>
-              <a:rPr lang="es-ES" sz="2200" b="1" dirty="0" smtClean="0"/>
-              <a:t>17 </a:t>
-            </a:r>
-            <a:r>
-              <a:rPr lang="es-ES" sz="2200" b="1" dirty="0" smtClean="0"/>
-              <a:t>de Marzo de 2013. </a:t>
-            </a:r>
-            <a:endParaRPr lang="es-ES" sz="2200" b="1" dirty="0" smtClean="0"/>
+              <a:t>Fecha Entrega : 17 de Marzo de 2013. </a:t>
+            </a:r>
           </a:p>
           <a:p>
             <a:pPr lvl="1"/>
@@ -9348,33 +9010,16 @@
             <a:pPr lvl="2"/>
             <a:r>
               <a:rPr lang="es-ES" sz="2200" b="1" dirty="0" smtClean="0"/>
-              <a:t>Fecha Estimada: </a:t>
-            </a:r>
+              <a:t>Fecha Estimada: 19 de Marzo de 2013. </a:t>
+            </a:r>
+            <a:endParaRPr lang="es-ES" sz="2600" dirty="0" smtClean="0"/>
+          </a:p>
+          <a:p>
+            <a:pPr lvl="2"/>
             <a:r>
               <a:rPr lang="es-ES" sz="2200" b="1" dirty="0" smtClean="0"/>
-              <a:t>19 </a:t>
-            </a:r>
-            <a:r>
-              <a:rPr lang="es-ES" sz="2200" b="1" dirty="0" smtClean="0"/>
-              <a:t>de Marzo de 2013. </a:t>
-            </a:r>
-            <a:endParaRPr lang="es-ES" sz="2600" dirty="0" smtClean="0"/>
-          </a:p>
-          <a:p>
-            <a:pPr lvl="2"/>
-            <a:r>
-              <a:rPr lang="es-ES" sz="2200" b="1" dirty="0" smtClean="0"/>
-              <a:t>Fecha Entrega : </a:t>
-            </a:r>
-            <a:r>
-              <a:rPr lang="es-ES" sz="2200" b="1" dirty="0" smtClean="0"/>
-              <a:t>20 </a:t>
-            </a:r>
-            <a:r>
-              <a:rPr lang="es-ES" sz="2200" b="1" dirty="0" smtClean="0"/>
-              <a:t>de Marzo de 2013. </a:t>
-            </a:r>
-            <a:endParaRPr lang="es-ES" sz="2200" b="1" dirty="0" smtClean="0"/>
+              <a:t>Fecha Entrega : 20 de Marzo de 2013. </a:t>
+            </a:r>
           </a:p>
           <a:p>
             <a:pPr lvl="1"/>
@@ -9387,31 +9032,15 @@
             <a:pPr lvl="2"/>
             <a:r>
               <a:rPr lang="es-ES" sz="2200" b="1" dirty="0" smtClean="0"/>
-              <a:t>Fecha Estimada: </a:t>
-            </a:r>
+              <a:t>Fecha Estimada: 24 de Marzo de 2013. </a:t>
+            </a:r>
+            <a:endParaRPr lang="es-ES" sz="2600" dirty="0" smtClean="0"/>
+          </a:p>
+          <a:p>
+            <a:pPr lvl="2"/>
             <a:r>
               <a:rPr lang="es-ES" sz="2200" b="1" dirty="0" smtClean="0"/>
-              <a:t>24 </a:t>
-            </a:r>
-            <a:r>
-              <a:rPr lang="es-ES" sz="2200" b="1" dirty="0" smtClean="0"/>
-              <a:t>de Marzo de 2013. </a:t>
-            </a:r>
-            <a:endParaRPr lang="es-ES" sz="2600" dirty="0" smtClean="0"/>
-          </a:p>
-          <a:p>
-            <a:pPr lvl="2"/>
-            <a:r>
-              <a:rPr lang="es-ES" sz="2200" b="1" dirty="0" smtClean="0"/>
-              <a:t>Fecha Entrega : </a:t>
-            </a:r>
-            <a:r>
-              <a:rPr lang="es-ES" sz="2200" b="1" dirty="0" smtClean="0"/>
-              <a:t>27 </a:t>
-            </a:r>
-            <a:r>
-              <a:rPr lang="es-ES" sz="2200" b="1" dirty="0" smtClean="0"/>
-              <a:t>de Marzo de 2013. </a:t>
+              <a:t>Fecha Entrega : 27 de Marzo de 2013. </a:t>
             </a:r>
           </a:p>
           <a:p>
@@ -9532,158 +9161,85 @@
             <a:pPr lvl="1"/>
             <a:r>
               <a:rPr lang="es-ES" sz="2400" dirty="0" smtClean="0"/>
-              <a:t>Primeros </a:t>
-            </a:r>
+              <a:t>Primeros bocetos de interfaz de usuario de la pantalla inicial e interacciones posibles. </a:t>
+            </a:r>
+          </a:p>
+          <a:p>
+            <a:pPr lvl="1"/>
             <a:r>
               <a:rPr lang="es-ES" sz="2400" dirty="0" smtClean="0"/>
-              <a:t>bocetos de interfaz de usuario de la pantalla inicial e interacciones posibles. </a:t>
+              <a:t>Instalación y configuración de la base de datos. </a:t>
             </a:r>
           </a:p>
           <a:p>
             <a:pPr lvl="1"/>
             <a:r>
               <a:rPr lang="es-ES" sz="2400" dirty="0" smtClean="0"/>
-              <a:t>Instalación </a:t>
-            </a:r>
+              <a:t>Paso de clases a modelo relacional. </a:t>
+            </a:r>
+          </a:p>
+          <a:p>
+            <a:pPr lvl="1"/>
             <a:r>
               <a:rPr lang="es-ES" sz="2400" dirty="0" smtClean="0"/>
-              <a:t>y configuración de la base de datos. </a:t>
+              <a:t>Creación de la base de datos. </a:t>
             </a:r>
           </a:p>
           <a:p>
             <a:pPr lvl="1"/>
             <a:r>
               <a:rPr lang="es-ES" sz="2400" dirty="0" smtClean="0"/>
-              <a:t>Paso </a:t>
-            </a:r>
+              <a:t>Conexión de la base de datos. </a:t>
+            </a:r>
+          </a:p>
+          <a:p>
+            <a:pPr lvl="1"/>
             <a:r>
               <a:rPr lang="es-ES" sz="2400" dirty="0" smtClean="0"/>
-              <a:t>de clases a modelo relacional. </a:t>
+              <a:t>Implementación del sistema a partir del Diagrama de Clases obtenido por el equipo de diseño. </a:t>
             </a:r>
           </a:p>
           <a:p>
             <a:pPr lvl="1"/>
             <a:r>
               <a:rPr lang="es-ES" sz="2400" dirty="0" smtClean="0"/>
-              <a:t>Creación </a:t>
-            </a:r>
+              <a:t>Bocetos de interfaz de usuario de las secciones del sistema correspondientes a “Gestión de Alumnos”, “Gestión de equipos”, “Gestión de entrenadores y administradores” y sus interacciones posibles. </a:t>
+            </a:r>
+          </a:p>
+          <a:p>
+            <a:pPr lvl="1"/>
             <a:r>
               <a:rPr lang="es-ES" sz="2400" dirty="0" smtClean="0"/>
-              <a:t>de la base de datos. </a:t>
+              <a:t>Implementación de las operaciones del sistema realizadas por el equipo de Diseño. </a:t>
             </a:r>
           </a:p>
           <a:p>
             <a:pPr lvl="1"/>
             <a:r>
               <a:rPr lang="es-ES" sz="2400" dirty="0" smtClean="0"/>
-              <a:t>Conexión </a:t>
-            </a:r>
+              <a:t>Implementación de la interfaz de usuario. </a:t>
+            </a:r>
+          </a:p>
+          <a:p>
+            <a:pPr lvl="1"/>
             <a:r>
               <a:rPr lang="es-ES" sz="2400" dirty="0" smtClean="0"/>
-              <a:t>de la base de datos. </a:t>
-            </a:r>
-          </a:p>
-          <a:p>
-            <a:pPr lvl="1"/>
-            <a:r>
-              <a:rPr lang="es-ES" sz="2400" dirty="0" smtClean="0"/>
-              <a:t>Implementación </a:t>
-            </a:r>
-            <a:r>
-              <a:rPr lang="es-ES" sz="2400" dirty="0" smtClean="0"/>
-              <a:t>del sistema a partir del Diagrama de Clases obtenido por el </a:t>
-            </a:r>
-            <a:r>
-              <a:rPr lang="es-ES" sz="2400" dirty="0" smtClean="0"/>
-              <a:t>equipo </a:t>
-            </a:r>
-            <a:r>
-              <a:rPr lang="es-ES" sz="2400" dirty="0" smtClean="0"/>
-              <a:t>de diseño. </a:t>
-            </a:r>
-          </a:p>
-          <a:p>
-            <a:pPr lvl="1"/>
-            <a:r>
-              <a:rPr lang="es-ES" sz="2400" dirty="0" smtClean="0"/>
-              <a:t>Bocetos </a:t>
-            </a:r>
-            <a:r>
-              <a:rPr lang="es-ES" sz="2400" dirty="0" smtClean="0"/>
-              <a:t>de interfaz de usuario de las secciones del sistema correspondientes a “Gestión de Alumnos”, “Gestión de equipos”, “Gestión de entrenadores y administradores” y sus interacciones posibles. </a:t>
-            </a:r>
-          </a:p>
-          <a:p>
-            <a:pPr lvl="1"/>
-            <a:r>
-              <a:rPr lang="es-ES" sz="2400" dirty="0" smtClean="0"/>
-              <a:t>Implementación </a:t>
-            </a:r>
-            <a:r>
-              <a:rPr lang="es-ES" sz="2400" dirty="0" smtClean="0"/>
-              <a:t>de las operaciones del sistema realizadas por el equipo de </a:t>
-            </a:r>
-            <a:r>
-              <a:rPr lang="es-ES" sz="2400" dirty="0" smtClean="0"/>
-              <a:t>Diseño</a:t>
-            </a:r>
-            <a:r>
-              <a:rPr lang="es-ES" sz="2400" dirty="0" smtClean="0"/>
-              <a:t>. </a:t>
-            </a:r>
-          </a:p>
-          <a:p>
-            <a:pPr lvl="1"/>
-            <a:r>
-              <a:rPr lang="es-ES" sz="2400" dirty="0" smtClean="0"/>
-              <a:t>Implementación </a:t>
-            </a:r>
-            <a:r>
-              <a:rPr lang="es-ES" sz="2400" dirty="0" smtClean="0"/>
-              <a:t>de la interfaz de usuario. </a:t>
-            </a:r>
-          </a:p>
-          <a:p>
-            <a:pPr lvl="1"/>
-            <a:r>
-              <a:rPr lang="es-ES" sz="2400" dirty="0" smtClean="0"/>
-              <a:t>Generar </a:t>
-            </a:r>
-            <a:r>
-              <a:rPr lang="es-ES" sz="2400" dirty="0" smtClean="0"/>
-              <a:t>documentación. </a:t>
-            </a:r>
-            <a:endParaRPr lang="es-ES" sz="2400" dirty="0" smtClean="0"/>
+              <a:t>Generar documentación. </a:t>
+            </a:r>
           </a:p>
           <a:p>
             <a:pPr lvl="2"/>
             <a:r>
               <a:rPr lang="es-ES" sz="3100" b="1" dirty="0" smtClean="0"/>
-              <a:t>Fecha Estimada: </a:t>
-            </a:r>
+              <a:t>Fecha Estimada: 26 de Marzo de 2013. </a:t>
+            </a:r>
+            <a:endParaRPr lang="es-ES" sz="3100" dirty="0" smtClean="0"/>
+          </a:p>
+          <a:p>
+            <a:pPr lvl="2"/>
             <a:r>
               <a:rPr lang="es-ES" sz="3100" b="1" dirty="0" smtClean="0"/>
-              <a:t>26 </a:t>
-            </a:r>
-            <a:r>
-              <a:rPr lang="es-ES" sz="3100" b="1" dirty="0" smtClean="0"/>
-              <a:t>de Marzo de 2013. </a:t>
-            </a:r>
-            <a:endParaRPr lang="es-ES" sz="3100" dirty="0" smtClean="0"/>
-          </a:p>
-          <a:p>
-            <a:pPr lvl="2"/>
-            <a:r>
-              <a:rPr lang="es-ES" sz="3100" b="1" dirty="0" smtClean="0"/>
-              <a:t>Fecha Entrega : </a:t>
-            </a:r>
-            <a:r>
-              <a:rPr lang="es-ES" sz="3100" b="1" dirty="0" smtClean="0"/>
-              <a:t>28 </a:t>
-            </a:r>
-            <a:r>
-              <a:rPr lang="es-ES" sz="3100" b="1" dirty="0" smtClean="0"/>
-              <a:t>de Marzo de 2013. </a:t>
+              <a:t>Fecha Entrega : 28 de Marzo de 2013. </a:t>
             </a:r>
           </a:p>
           <a:p>
@@ -9809,33 +9365,21 @@
             <a:pPr lvl="1"/>
             <a:r>
               <a:rPr lang="es-ES" sz="2400" dirty="0" smtClean="0"/>
-              <a:t>Planificación </a:t>
-            </a:r>
+              <a:t>Planificación de recursos y tareas para la primera iteración. </a:t>
+            </a:r>
+          </a:p>
+          <a:p>
+            <a:pPr lvl="1"/>
             <a:r>
               <a:rPr lang="es-ES" sz="2400" dirty="0" smtClean="0"/>
-              <a:t>de recursos y tareas para la primera iteración. </a:t>
+              <a:t>Creación de diagramas de tiempos (Gantt). </a:t>
             </a:r>
           </a:p>
           <a:p>
             <a:pPr lvl="1"/>
             <a:r>
               <a:rPr lang="es-ES" sz="2400" dirty="0" smtClean="0"/>
-              <a:t>Creación </a:t>
-            </a:r>
-            <a:r>
-              <a:rPr lang="es-ES" sz="2400" dirty="0" smtClean="0"/>
-              <a:t>de diagramas de tiempos (Gantt). </a:t>
-            </a:r>
-          </a:p>
-          <a:p>
-            <a:pPr lvl="1"/>
-            <a:r>
-              <a:rPr lang="es-ES" sz="2400" dirty="0" smtClean="0"/>
-              <a:t>Creación </a:t>
-            </a:r>
-            <a:r>
-              <a:rPr lang="es-ES" sz="2400" dirty="0" smtClean="0"/>
-              <a:t>de la red de tareas (</a:t>
+              <a:t>Creación de la red de tareas (</a:t>
             </a:r>
             <a:r>
               <a:rPr lang="es-ES" sz="2400" dirty="0" err="1" smtClean="0"/>
@@ -9850,13 +9394,8 @@
             <a:pPr lvl="1"/>
             <a:r>
               <a:rPr lang="es-ES" sz="2400" dirty="0" smtClean="0"/>
-              <a:t>Revisión </a:t>
-            </a:r>
-            <a:r>
-              <a:rPr lang="es-ES" sz="2400" dirty="0" smtClean="0"/>
-              <a:t>de los documentos de los equipos de Diseño e Implementación. </a:t>
-            </a:r>
-            <a:endParaRPr lang="es-ES" sz="2400" dirty="0" smtClean="0"/>
+              <a:t>Revisión de los documentos de los equipos de Diseño e Implementación. </a:t>
+            </a:r>
           </a:p>
           <a:p>
             <a:pPr lvl="1"/>
@@ -9921,15 +9460,7 @@
             <a:pPr algn="ctr" fontAlgn="base"/>
             <a:r>
               <a:rPr lang="es-ES" sz="4400" dirty="0" smtClean="0"/>
-              <a:t>Iteración </a:t>
-            </a:r>
-            <a:r>
-              <a:rPr lang="es-ES" sz="4400" dirty="0" smtClean="0"/>
-              <a:t>2.</a:t>
-            </a:r>
-            <a:r>
-              <a:rPr lang="es-ES" sz="4400" dirty="0" smtClean="0"/>
-              <a:t/>
+              <a:t>Iteración 2.</a:t>
             </a:r>
             <a:br>
               <a:rPr lang="es-ES" sz="4400" dirty="0" smtClean="0"/>

</xml_diff>